<commit_message>
Added Summary to Presentation
</commit_message>
<xml_diff>
--- a/Documentation/Team Fantastic Five Presentation - Design Document.pptx
+++ b/Documentation/Team Fantastic Five Presentation - Design Document.pptx
@@ -7,14 +7,15 @@
   <p:sldIdLst>
     <p:sldId id="256" r:id="rId2"/>
     <p:sldId id="257" r:id="rId3"/>
-    <p:sldId id="258" r:id="rId4"/>
-    <p:sldId id="259" r:id="rId5"/>
-    <p:sldId id="260" r:id="rId6"/>
-    <p:sldId id="263" r:id="rId7"/>
-    <p:sldId id="265" r:id="rId8"/>
-    <p:sldId id="264" r:id="rId9"/>
-    <p:sldId id="266" r:id="rId10"/>
-    <p:sldId id="267" r:id="rId11"/>
+    <p:sldId id="269" r:id="rId4"/>
+    <p:sldId id="258" r:id="rId5"/>
+    <p:sldId id="259" r:id="rId6"/>
+    <p:sldId id="260" r:id="rId7"/>
+    <p:sldId id="263" r:id="rId8"/>
+    <p:sldId id="265" r:id="rId9"/>
+    <p:sldId id="264" r:id="rId10"/>
+    <p:sldId id="266" r:id="rId11"/>
+    <p:sldId id="267" r:id="rId12"/>
   </p:sldIdLst>
   <p:sldSz cx="12192000" cy="6858000"/>
   <p:notesSz cx="6858000" cy="9144000"/>
@@ -3486,6 +3487,120 @@
       </p:grpSpPr>
       <p:sp>
         <p:nvSpPr>
+          <p:cNvPr id="3" name="Title 1"/>
+          <p:cNvSpPr txBox="1">
+            <a:spLocks/>
+          </p:cNvSpPr>
+          <p:nvPr/>
+        </p:nvSpPr>
+        <p:spPr>
+          <a:xfrm>
+            <a:off x="2873829" y="252867"/>
+            <a:ext cx="8229600" cy="1143000"/>
+          </a:xfrm>
+          <a:prstGeom prst="rect">
+            <a:avLst/>
+          </a:prstGeom>
+        </p:spPr>
+        <p:txBody>
+          <a:bodyPr/>
+          <a:lstStyle>
+            <a:lvl1pPr algn="l" defTabSz="914400" rtl="0" eaLnBrk="1" latinLnBrk="1" hangingPunct="1">
+              <a:lnSpc>
+                <a:spcPct val="90000"/>
+              </a:lnSpc>
+              <a:spcBef>
+                <a:spcPct val="0"/>
+              </a:spcBef>
+              <a:buNone/>
+              <a:defRPr sz="4400" kern="1200">
+                <a:solidFill>
+                  <a:schemeClr val="tx1"/>
+                </a:solidFill>
+                <a:latin typeface="+mj-lt"/>
+                <a:ea typeface="+mj-ea"/>
+                <a:cs typeface="+mj-cs"/>
+              </a:defRPr>
+            </a:lvl1pPr>
+          </a:lstStyle>
+          <a:p>
+            <a:r>
+              <a:rPr lang="en-US" b="1" dirty="0" smtClean="0"/>
+              <a:t>Game Loop Sequence</a:t>
+            </a:r>
+            <a:endParaRPr lang="en-IE" b="1" dirty="0"/>
+          </a:p>
+        </p:txBody>
+      </p:sp>
+      <p:pic>
+        <p:nvPicPr>
+          <p:cNvPr id="4" name="Picture 3"/>
+          <p:cNvPicPr>
+            <a:picLocks noChangeAspect="1"/>
+          </p:cNvPicPr>
+          <p:nvPr/>
+        </p:nvPicPr>
+        <p:blipFill>
+          <a:blip r:embed="rId2">
+            <a:extLst>
+              <a:ext uri="{28A0092B-C50C-407E-A947-70E740481C1C}">
+                <a14:useLocalDpi xmlns:a14="http://schemas.microsoft.com/office/drawing/2010/main" val="0"/>
+              </a:ext>
+            </a:extLst>
+          </a:blip>
+          <a:stretch>
+            <a:fillRect/>
+          </a:stretch>
+        </p:blipFill>
+        <p:spPr>
+          <a:xfrm>
+            <a:off x="0" y="1045029"/>
+            <a:ext cx="12192000" cy="5812971"/>
+          </a:xfrm>
+          <a:prstGeom prst="rect">
+            <a:avLst/>
+          </a:prstGeom>
+        </p:spPr>
+      </p:pic>
+    </p:spTree>
+    <p:extLst>
+      <p:ext uri="{BB962C8B-B14F-4D97-AF65-F5344CB8AC3E}">
+        <p14:creationId xmlns:p14="http://schemas.microsoft.com/office/powerpoint/2010/main" val="2635053961"/>
+      </p:ext>
+    </p:extLst>
+  </p:cSld>
+  <p:clrMapOvr>
+    <a:masterClrMapping/>
+  </p:clrMapOvr>
+  <p:timing>
+    <p:tnLst>
+      <p:par>
+        <p:cTn id="1" dur="indefinite" restart="never" nodeType="tmRoot"/>
+      </p:par>
+    </p:tnLst>
+  </p:timing>
+</p:sld>
+</file>
+
+<file path=ppt/slides/slide11.xml><?xml version="1.0" encoding="utf-8"?>
+<p:sld xmlns:a="http://schemas.openxmlformats.org/drawingml/2006/main" xmlns:r="http://schemas.openxmlformats.org/officeDocument/2006/relationships" xmlns:p="http://schemas.openxmlformats.org/presentationml/2006/main">
+  <p:cSld>
+    <p:spTree>
+      <p:nvGrpSpPr>
+        <p:cNvPr id="1" name=""/>
+        <p:cNvGrpSpPr/>
+        <p:nvPr/>
+      </p:nvGrpSpPr>
+      <p:grpSpPr>
+        <a:xfrm>
+          <a:off x="0" y="0"/>
+          <a:ext cx="0" cy="0"/>
+          <a:chOff x="0" y="0"/>
+          <a:chExt cx="0" cy="0"/>
+        </a:xfrm>
+      </p:grpSpPr>
+      <p:sp>
+        <p:nvSpPr>
           <p:cNvPr id="2" name="Title 1"/>
           <p:cNvSpPr txBox="1">
             <a:spLocks/>
@@ -3968,7 +4083,7 @@
       </p:grpSpPr>
       <p:sp>
         <p:nvSpPr>
-          <p:cNvPr id="7" name="Title 1"/>
+          <p:cNvPr id="10" name="Title 1"/>
           <p:cNvSpPr txBox="1">
             <a:spLocks/>
           </p:cNvSpPr>
@@ -4007,8 +4122,8 @@
           <a:p>
             <a:pPr algn="ctr"/>
             <a:r>
-              <a:rPr lang="en-US" b="1" dirty="0" smtClean="0"/>
-              <a:t>Assumptions &amp; Dependencies</a:t>
+              <a:rPr lang="en-IE" b="1" dirty="0" smtClean="0"/>
+              <a:t>Summary</a:t>
             </a:r>
             <a:endParaRPr lang="en-IE" b="1" dirty="0"/>
           </a:p>
@@ -4016,7 +4131,7 @@
       </p:sp>
       <p:sp>
         <p:nvSpPr>
-          <p:cNvPr id="8" name="Content Placeholder 2"/>
+          <p:cNvPr id="11" name="Content Placeholder 2"/>
           <p:cNvSpPr txBox="1">
             <a:spLocks/>
           </p:cNvSpPr>
@@ -4025,7 +4140,7 @@
         <p:spPr>
           <a:xfrm>
             <a:off x="457200" y="1600200"/>
-            <a:ext cx="8229600" cy="4525963"/>
+            <a:ext cx="11478126" cy="4993105"/>
           </a:xfrm>
           <a:prstGeom prst="rect">
             <a:avLst/>
@@ -4199,35 +4314,55 @@
           </a:lstStyle>
           <a:p>
             <a:r>
-              <a:rPr lang="en-US" sz="4400" dirty="0" smtClean="0"/>
-              <a:t>Portability</a:t>
-            </a:r>
-          </a:p>
-          <a:p>
-            <a:r>
-              <a:rPr lang="en-US" sz="4400" dirty="0" smtClean="0"/>
-              <a:t>Easily configurable</a:t>
-            </a:r>
-          </a:p>
-          <a:p>
-            <a:r>
-              <a:rPr lang="en-US" sz="4400" dirty="0" smtClean="0"/>
-              <a:t>Multiple control schemes</a:t>
-            </a:r>
-          </a:p>
-          <a:p>
-            <a:r>
-              <a:rPr lang="en-US" sz="4400" dirty="0" smtClean="0"/>
-              <a:t>Freedom</a:t>
-            </a:r>
-            <a:endParaRPr lang="en-US" sz="4400" dirty="0"/>
+              <a:rPr lang="en-IE" sz="4400" i="1" dirty="0" smtClean="0"/>
+              <a:t>The </a:t>
+            </a:r>
+            <a:r>
+              <a:rPr lang="en-IE" sz="4400" i="1" dirty="0" smtClean="0"/>
+              <a:t>pr</a:t>
+            </a:r>
+            <a:r>
+              <a:rPr lang="en-IE" sz="4400" i="1" dirty="0" smtClean="0"/>
+              <a:t>oject is Tanks, the remake of the     arcade game </a:t>
+            </a:r>
+            <a:r>
+              <a:rPr lang="en-IE" sz="4400" i="1" dirty="0" err="1" smtClean="0"/>
+              <a:t>Battlezone</a:t>
+            </a:r>
+            <a:r>
+              <a:rPr lang="en-IE" sz="4400" i="1" dirty="0" smtClean="0"/>
+              <a:t> </a:t>
+            </a:r>
+          </a:p>
+          <a:p>
+            <a:r>
+              <a:rPr lang="en-IE" sz="4400" i="1" dirty="0" smtClean="0"/>
+              <a:t>As well as remake </a:t>
+            </a:r>
+            <a:r>
+              <a:rPr lang="en-IE" sz="4400" i="1" dirty="0" err="1" smtClean="0"/>
+              <a:t>Battlezone</a:t>
+            </a:r>
+            <a:r>
+              <a:rPr lang="en-IE" sz="4400" i="1" dirty="0" smtClean="0"/>
+              <a:t>, we are also  required to implement </a:t>
+            </a:r>
+            <a:r>
+              <a:rPr lang="en-IE" sz="4400" i="1" dirty="0" err="1" smtClean="0"/>
+              <a:t>Kinect</a:t>
+            </a:r>
+            <a:r>
+              <a:rPr lang="en-IE" sz="4400" i="1" dirty="0" smtClean="0"/>
+              <a:t> support</a:t>
+            </a:r>
+            <a:endParaRPr lang="en-IE" sz="4400" i="1" dirty="0"/>
           </a:p>
         </p:txBody>
       </p:sp>
     </p:spTree>
     <p:extLst>
       <p:ext uri="{BB962C8B-B14F-4D97-AF65-F5344CB8AC3E}">
-        <p14:creationId xmlns:p14="http://schemas.microsoft.com/office/powerpoint/2010/main" val="41757112"/>
+        <p14:creationId xmlns:p14="http://schemas.microsoft.com/office/powerpoint/2010/main" val="2162192231"/>
       </p:ext>
     </p:extLst>
   </p:cSld>
@@ -4278,7 +4413,7 @@
       </p:grpSpPr>
       <p:sp>
         <p:nvSpPr>
-          <p:cNvPr id="2" name="Title 1"/>
+          <p:cNvPr id="7" name="Title 1"/>
           <p:cNvSpPr txBox="1">
             <a:spLocks/>
           </p:cNvSpPr>
@@ -4286,7 +4421,7 @@
         </p:nvSpPr>
         <p:spPr>
           <a:xfrm>
-            <a:off x="2680177" y="274638"/>
+            <a:off x="1973179" y="216568"/>
             <a:ext cx="8229600" cy="1143000"/>
           </a:xfrm>
           <a:prstGeom prst="rect">
@@ -4315,9 +4450,10 @@
             </a:lvl1pPr>
           </a:lstStyle>
           <a:p>
+            <a:pPr algn="ctr"/>
             <a:r>
               <a:rPr lang="en-US" b="1" dirty="0" smtClean="0"/>
-              <a:t>Development Methods</a:t>
+              <a:t>Assumptions &amp; Dependencies</a:t>
             </a:r>
             <a:endParaRPr lang="en-IE" b="1" dirty="0"/>
           </a:p>
@@ -4325,7 +4461,7 @@
       </p:sp>
       <p:sp>
         <p:nvSpPr>
-          <p:cNvPr id="4" name="Content Placeholder 2"/>
+          <p:cNvPr id="8" name="Content Placeholder 2"/>
           <p:cNvSpPr txBox="1">
             <a:spLocks/>
           </p:cNvSpPr>
@@ -4333,8 +4469,8 @@
         </p:nvSpPr>
         <p:spPr>
           <a:xfrm>
-            <a:off x="457199" y="1600200"/>
-            <a:ext cx="11454063" cy="4525963"/>
+            <a:off x="457200" y="1600200"/>
+            <a:ext cx="8229600" cy="4525963"/>
           </a:xfrm>
           <a:prstGeom prst="rect">
             <a:avLst/>
@@ -4509,39 +4645,34 @@
           <a:p>
             <a:r>
               <a:rPr lang="en-US" sz="4400" dirty="0" smtClean="0"/>
-              <a:t>Agile Software Development (SCRUM)</a:t>
-            </a:r>
-            <a:endParaRPr lang="en-US" sz="4400" dirty="0" smtClean="0"/>
+              <a:t>Portability</a:t>
+            </a:r>
           </a:p>
           <a:p>
             <a:r>
               <a:rPr lang="en-US" sz="4400" dirty="0" smtClean="0"/>
-              <a:t>One week development cycles</a:t>
+              <a:t>Easily configurable</a:t>
             </a:r>
           </a:p>
           <a:p>
             <a:r>
               <a:rPr lang="en-US" sz="4400" dirty="0" smtClean="0"/>
-              <a:t>Meeting </a:t>
-            </a:r>
-            <a:r>
-              <a:rPr lang="en-US" sz="4400" dirty="0" err="1" smtClean="0"/>
-              <a:t>gamesfleadh</a:t>
-            </a:r>
-            <a:endParaRPr lang="en-US" sz="4400" dirty="0" smtClean="0"/>
-          </a:p>
-          <a:p>
-            <a:endParaRPr lang="en-US" sz="4400" dirty="0" smtClean="0"/>
-          </a:p>
-          <a:p>
-            <a:endParaRPr lang="en-IE" dirty="0"/>
+              <a:t>Multiple control schemes</a:t>
+            </a:r>
+          </a:p>
+          <a:p>
+            <a:r>
+              <a:rPr lang="en-US" sz="4400" dirty="0" smtClean="0"/>
+              <a:t>Freedom</a:t>
+            </a:r>
+            <a:endParaRPr lang="en-US" sz="4400" dirty="0"/>
           </a:p>
         </p:txBody>
       </p:sp>
     </p:spTree>
     <p:extLst>
       <p:ext uri="{BB962C8B-B14F-4D97-AF65-F5344CB8AC3E}">
-        <p14:creationId xmlns:p14="http://schemas.microsoft.com/office/powerpoint/2010/main" val="1401362576"/>
+        <p14:creationId xmlns:p14="http://schemas.microsoft.com/office/powerpoint/2010/main" val="41757112"/>
       </p:ext>
     </p:extLst>
   </p:cSld>
@@ -4600,8 +4731,8 @@
         </p:nvSpPr>
         <p:spPr>
           <a:xfrm>
-            <a:off x="1850571" y="416928"/>
-            <a:ext cx="8932015" cy="1143000"/>
+            <a:off x="2680177" y="274638"/>
+            <a:ext cx="8229600" cy="1143000"/>
           </a:xfrm>
           <a:prstGeom prst="rect">
             <a:avLst/>
@@ -4631,7 +4762,7 @@
           <a:p>
             <a:r>
               <a:rPr lang="en-US" b="1" dirty="0" smtClean="0"/>
-              <a:t>High Level System Architecture</a:t>
+              <a:t>Development Methods</a:t>
             </a:r>
             <a:endParaRPr lang="en-IE" b="1" dirty="0"/>
           </a:p>
@@ -4639,7 +4770,7 @@
       </p:sp>
       <p:sp>
         <p:nvSpPr>
-          <p:cNvPr id="3" name="Content Placeholder 2"/>
+          <p:cNvPr id="4" name="Content Placeholder 2"/>
           <p:cNvSpPr txBox="1">
             <a:spLocks/>
           </p:cNvSpPr>
@@ -4647,8 +4778,8 @@
         </p:nvSpPr>
         <p:spPr>
           <a:xfrm>
-            <a:off x="457200" y="1600200"/>
-            <a:ext cx="8229600" cy="4525963"/>
+            <a:off x="457199" y="1600200"/>
+            <a:ext cx="11454063" cy="4525963"/>
           </a:xfrm>
           <a:prstGeom prst="rect">
             <a:avLst/>
@@ -4823,6 +4954,319 @@
           <a:p>
             <a:r>
               <a:rPr lang="en-US" sz="4400" dirty="0" smtClean="0"/>
+              <a:t>Agile Software Development (SCRUM)</a:t>
+            </a:r>
+          </a:p>
+          <a:p>
+            <a:r>
+              <a:rPr lang="en-US" sz="4400" dirty="0" smtClean="0"/>
+              <a:t>One week development cycles</a:t>
+            </a:r>
+          </a:p>
+          <a:p>
+            <a:r>
+              <a:rPr lang="en-US" sz="4400" dirty="0" smtClean="0"/>
+              <a:t>Meeting </a:t>
+            </a:r>
+            <a:r>
+              <a:rPr lang="en-US" sz="4400" dirty="0" err="1" smtClean="0"/>
+              <a:t>gamesfleadh</a:t>
+            </a:r>
+            <a:endParaRPr lang="en-US" sz="4400" dirty="0" smtClean="0"/>
+          </a:p>
+          <a:p>
+            <a:endParaRPr lang="en-US" sz="4400" dirty="0" smtClean="0"/>
+          </a:p>
+          <a:p>
+            <a:endParaRPr lang="en-IE" dirty="0"/>
+          </a:p>
+        </p:txBody>
+      </p:sp>
+    </p:spTree>
+    <p:extLst>
+      <p:ext uri="{BB962C8B-B14F-4D97-AF65-F5344CB8AC3E}">
+        <p14:creationId xmlns:p14="http://schemas.microsoft.com/office/powerpoint/2010/main" val="1401362576"/>
+      </p:ext>
+    </p:extLst>
+  </p:cSld>
+  <p:clrMapOvr>
+    <a:masterClrMapping/>
+  </p:clrMapOvr>
+  <p:timing>
+    <p:tnLst>
+      <p:par>
+        <p:cTn id="1" dur="indefinite" restart="never" nodeType="tmRoot"/>
+      </p:par>
+    </p:tnLst>
+  </p:timing>
+</p:sld>
+</file>
+
+<file path=ppt/slides/slide6.xml><?xml version="1.0" encoding="utf-8"?>
+<p:sld xmlns:a="http://schemas.openxmlformats.org/drawingml/2006/main" xmlns:r="http://schemas.openxmlformats.org/officeDocument/2006/relationships" xmlns:p="http://schemas.openxmlformats.org/presentationml/2006/main">
+  <p:cSld>
+    <p:bg>
+      <p:bgPr>
+        <a:blipFill dpi="0" rotWithShape="1">
+          <a:blip r:embed="rId2">
+            <a:alphaModFix amt="20000"/>
+            <a:lum/>
+          </a:blip>
+          <a:srcRect/>
+          <a:stretch>
+            <a:fillRect t="-55000" b="-55000"/>
+          </a:stretch>
+        </a:blipFill>
+        <a:effectLst/>
+      </p:bgPr>
+    </p:bg>
+    <p:spTree>
+      <p:nvGrpSpPr>
+        <p:cNvPr id="1" name=""/>
+        <p:cNvGrpSpPr/>
+        <p:nvPr/>
+      </p:nvGrpSpPr>
+      <p:grpSpPr>
+        <a:xfrm>
+          <a:off x="0" y="0"/>
+          <a:ext cx="0" cy="0"/>
+          <a:chOff x="0" y="0"/>
+          <a:chExt cx="0" cy="0"/>
+        </a:xfrm>
+      </p:grpSpPr>
+      <p:sp>
+        <p:nvSpPr>
+          <p:cNvPr id="2" name="Title 1"/>
+          <p:cNvSpPr txBox="1">
+            <a:spLocks/>
+          </p:cNvSpPr>
+          <p:nvPr/>
+        </p:nvSpPr>
+        <p:spPr>
+          <a:xfrm>
+            <a:off x="1850571" y="416928"/>
+            <a:ext cx="8932015" cy="1143000"/>
+          </a:xfrm>
+          <a:prstGeom prst="rect">
+            <a:avLst/>
+          </a:prstGeom>
+        </p:spPr>
+        <p:txBody>
+          <a:bodyPr/>
+          <a:lstStyle>
+            <a:lvl1pPr algn="l" defTabSz="914400" rtl="0" eaLnBrk="1" latinLnBrk="1" hangingPunct="1">
+              <a:lnSpc>
+                <a:spcPct val="90000"/>
+              </a:lnSpc>
+              <a:spcBef>
+                <a:spcPct val="0"/>
+              </a:spcBef>
+              <a:buNone/>
+              <a:defRPr sz="4400" kern="1200">
+                <a:solidFill>
+                  <a:schemeClr val="tx1"/>
+                </a:solidFill>
+                <a:latin typeface="+mj-lt"/>
+                <a:ea typeface="+mj-ea"/>
+                <a:cs typeface="+mj-cs"/>
+              </a:defRPr>
+            </a:lvl1pPr>
+          </a:lstStyle>
+          <a:p>
+            <a:r>
+              <a:rPr lang="en-US" b="1" dirty="0" smtClean="0"/>
+              <a:t>High Level System Architecture</a:t>
+            </a:r>
+            <a:endParaRPr lang="en-IE" b="1" dirty="0"/>
+          </a:p>
+        </p:txBody>
+      </p:sp>
+      <p:sp>
+        <p:nvSpPr>
+          <p:cNvPr id="3" name="Content Placeholder 2"/>
+          <p:cNvSpPr txBox="1">
+            <a:spLocks/>
+          </p:cNvSpPr>
+          <p:nvPr/>
+        </p:nvSpPr>
+        <p:spPr>
+          <a:xfrm>
+            <a:off x="457200" y="1600200"/>
+            <a:ext cx="8229600" cy="4525963"/>
+          </a:xfrm>
+          <a:prstGeom prst="rect">
+            <a:avLst/>
+          </a:prstGeom>
+        </p:spPr>
+        <p:txBody>
+          <a:bodyPr/>
+          <a:lstStyle>
+            <a:lvl1pPr marL="228600" indent="-228600" algn="l" defTabSz="914400" rtl="0" eaLnBrk="1" latinLnBrk="1" hangingPunct="1">
+              <a:lnSpc>
+                <a:spcPct val="90000"/>
+              </a:lnSpc>
+              <a:spcBef>
+                <a:spcPts val="1000"/>
+              </a:spcBef>
+              <a:buFont typeface="Arial" panose="020B0604020202020204" pitchFamily="34" charset="0"/>
+              <a:buChar char="•"/>
+              <a:defRPr sz="2800" kern="1200">
+                <a:solidFill>
+                  <a:schemeClr val="tx1"/>
+                </a:solidFill>
+                <a:latin typeface="+mn-lt"/>
+                <a:ea typeface="+mn-ea"/>
+                <a:cs typeface="+mn-cs"/>
+              </a:defRPr>
+            </a:lvl1pPr>
+            <a:lvl2pPr marL="685800" indent="-228600" algn="l" defTabSz="914400" rtl="0" eaLnBrk="1" latinLnBrk="1" hangingPunct="1">
+              <a:lnSpc>
+                <a:spcPct val="90000"/>
+              </a:lnSpc>
+              <a:spcBef>
+                <a:spcPts val="500"/>
+              </a:spcBef>
+              <a:buFont typeface="Arial" panose="020B0604020202020204" pitchFamily="34" charset="0"/>
+              <a:buChar char="•"/>
+              <a:defRPr sz="2400" kern="1200">
+                <a:solidFill>
+                  <a:schemeClr val="tx1"/>
+                </a:solidFill>
+                <a:latin typeface="+mn-lt"/>
+                <a:ea typeface="+mn-ea"/>
+                <a:cs typeface="+mn-cs"/>
+              </a:defRPr>
+            </a:lvl2pPr>
+            <a:lvl3pPr marL="1143000" indent="-228600" algn="l" defTabSz="914400" rtl="0" eaLnBrk="1" latinLnBrk="1" hangingPunct="1">
+              <a:lnSpc>
+                <a:spcPct val="90000"/>
+              </a:lnSpc>
+              <a:spcBef>
+                <a:spcPts val="500"/>
+              </a:spcBef>
+              <a:buFont typeface="Arial" panose="020B0604020202020204" pitchFamily="34" charset="0"/>
+              <a:buChar char="•"/>
+              <a:defRPr sz="2000" kern="1200">
+                <a:solidFill>
+                  <a:schemeClr val="tx1"/>
+                </a:solidFill>
+                <a:latin typeface="+mn-lt"/>
+                <a:ea typeface="+mn-ea"/>
+                <a:cs typeface="+mn-cs"/>
+              </a:defRPr>
+            </a:lvl3pPr>
+            <a:lvl4pPr marL="1600200" indent="-228600" algn="l" defTabSz="914400" rtl="0" eaLnBrk="1" latinLnBrk="1" hangingPunct="1">
+              <a:lnSpc>
+                <a:spcPct val="90000"/>
+              </a:lnSpc>
+              <a:spcBef>
+                <a:spcPts val="500"/>
+              </a:spcBef>
+              <a:buFont typeface="Arial" panose="020B0604020202020204" pitchFamily="34" charset="0"/>
+              <a:buChar char="•"/>
+              <a:defRPr sz="1800" kern="1200">
+                <a:solidFill>
+                  <a:schemeClr val="tx1"/>
+                </a:solidFill>
+                <a:latin typeface="+mn-lt"/>
+                <a:ea typeface="+mn-ea"/>
+                <a:cs typeface="+mn-cs"/>
+              </a:defRPr>
+            </a:lvl4pPr>
+            <a:lvl5pPr marL="2057400" indent="-228600" algn="l" defTabSz="914400" rtl="0" eaLnBrk="1" latinLnBrk="1" hangingPunct="1">
+              <a:lnSpc>
+                <a:spcPct val="90000"/>
+              </a:lnSpc>
+              <a:spcBef>
+                <a:spcPts val="500"/>
+              </a:spcBef>
+              <a:buFont typeface="Arial" panose="020B0604020202020204" pitchFamily="34" charset="0"/>
+              <a:buChar char="•"/>
+              <a:defRPr sz="1800" kern="1200">
+                <a:solidFill>
+                  <a:schemeClr val="tx1"/>
+                </a:solidFill>
+                <a:latin typeface="+mn-lt"/>
+                <a:ea typeface="+mn-ea"/>
+                <a:cs typeface="+mn-cs"/>
+              </a:defRPr>
+            </a:lvl5pPr>
+            <a:lvl6pPr marL="2514600" indent="-228600" algn="l" defTabSz="914400" rtl="0" eaLnBrk="1" latinLnBrk="1" hangingPunct="1">
+              <a:lnSpc>
+                <a:spcPct val="90000"/>
+              </a:lnSpc>
+              <a:spcBef>
+                <a:spcPts val="500"/>
+              </a:spcBef>
+              <a:buFont typeface="Arial" panose="020B0604020202020204" pitchFamily="34" charset="0"/>
+              <a:buChar char="•"/>
+              <a:defRPr sz="1800" kern="1200">
+                <a:solidFill>
+                  <a:schemeClr val="tx1"/>
+                </a:solidFill>
+                <a:latin typeface="+mn-lt"/>
+                <a:ea typeface="+mn-ea"/>
+                <a:cs typeface="+mn-cs"/>
+              </a:defRPr>
+            </a:lvl6pPr>
+            <a:lvl7pPr marL="2971800" indent="-228600" algn="l" defTabSz="914400" rtl="0" eaLnBrk="1" latinLnBrk="1" hangingPunct="1">
+              <a:lnSpc>
+                <a:spcPct val="90000"/>
+              </a:lnSpc>
+              <a:spcBef>
+                <a:spcPts val="500"/>
+              </a:spcBef>
+              <a:buFont typeface="Arial" panose="020B0604020202020204" pitchFamily="34" charset="0"/>
+              <a:buChar char="•"/>
+              <a:defRPr sz="1800" kern="1200">
+                <a:solidFill>
+                  <a:schemeClr val="tx1"/>
+                </a:solidFill>
+                <a:latin typeface="+mn-lt"/>
+                <a:ea typeface="+mn-ea"/>
+                <a:cs typeface="+mn-cs"/>
+              </a:defRPr>
+            </a:lvl7pPr>
+            <a:lvl8pPr marL="3429000" indent="-228600" algn="l" defTabSz="914400" rtl="0" eaLnBrk="1" latinLnBrk="1" hangingPunct="1">
+              <a:lnSpc>
+                <a:spcPct val="90000"/>
+              </a:lnSpc>
+              <a:spcBef>
+                <a:spcPts val="500"/>
+              </a:spcBef>
+              <a:buFont typeface="Arial" panose="020B0604020202020204" pitchFamily="34" charset="0"/>
+              <a:buChar char="•"/>
+              <a:defRPr sz="1800" kern="1200">
+                <a:solidFill>
+                  <a:schemeClr val="tx1"/>
+                </a:solidFill>
+                <a:latin typeface="+mn-lt"/>
+                <a:ea typeface="+mn-ea"/>
+                <a:cs typeface="+mn-cs"/>
+              </a:defRPr>
+            </a:lvl8pPr>
+            <a:lvl9pPr marL="3886200" indent="-228600" algn="l" defTabSz="914400" rtl="0" eaLnBrk="1" latinLnBrk="1" hangingPunct="1">
+              <a:lnSpc>
+                <a:spcPct val="90000"/>
+              </a:lnSpc>
+              <a:spcBef>
+                <a:spcPts val="500"/>
+              </a:spcBef>
+              <a:buFont typeface="Arial" panose="020B0604020202020204" pitchFamily="34" charset="0"/>
+              <a:buChar char="•"/>
+              <a:defRPr sz="1800" kern="1200">
+                <a:solidFill>
+                  <a:schemeClr val="tx1"/>
+                </a:solidFill>
+                <a:latin typeface="+mn-lt"/>
+                <a:ea typeface="+mn-ea"/>
+                <a:cs typeface="+mn-cs"/>
+              </a:defRPr>
+            </a:lvl9pPr>
+          </a:lstStyle>
+          <a:p>
+            <a:r>
+              <a:rPr lang="en-US" sz="4400" dirty="0" smtClean="0"/>
               <a:t>Unity3D Integration</a:t>
             </a:r>
           </a:p>
@@ -4845,7 +5289,6 @@
               <a:rPr lang="en-US" sz="4400" dirty="0" smtClean="0"/>
               <a:t>” Graphics Plug-in</a:t>
             </a:r>
-            <a:endParaRPr lang="en-US" sz="4400" dirty="0" smtClean="0"/>
           </a:p>
           <a:p>
             <a:pPr marL="0" indent="0">
@@ -4879,7 +5322,7 @@
 </p:sld>
 </file>
 
-<file path=ppt/slides/slide6.xml><?xml version="1.0" encoding="utf-8"?>
+<file path=ppt/slides/slide7.xml><?xml version="1.0" encoding="utf-8"?>
 <p:sld xmlns:a="http://schemas.openxmlformats.org/drawingml/2006/main" xmlns:r="http://schemas.openxmlformats.org/officeDocument/2006/relationships" xmlns:p="http://schemas.openxmlformats.org/presentationml/2006/main">
   <p:cSld>
     <p:spTree>
@@ -4993,7 +5436,7 @@
 </p:sld>
 </file>
 
-<file path=ppt/slides/slide7.xml><?xml version="1.0" encoding="utf-8"?>
+<file path=ppt/slides/slide8.xml><?xml version="1.0" encoding="utf-8"?>
 <p:sld xmlns:a="http://schemas.openxmlformats.org/drawingml/2006/main" xmlns:r="http://schemas.openxmlformats.org/officeDocument/2006/relationships" xmlns:p="http://schemas.openxmlformats.org/presentationml/2006/main">
   <p:cSld>
     <p:spTree>
@@ -5107,7 +5550,7 @@
 </p:sld>
 </file>
 
-<file path=ppt/slides/slide8.xml><?xml version="1.0" encoding="utf-8"?>
+<file path=ppt/slides/slide9.xml><?xml version="1.0" encoding="utf-8"?>
 <p:sld xmlns:a="http://schemas.openxmlformats.org/drawingml/2006/main" xmlns:r="http://schemas.openxmlformats.org/officeDocument/2006/relationships" xmlns:p="http://schemas.openxmlformats.org/presentationml/2006/main">
   <p:cSld>
     <p:spTree>
@@ -5205,120 +5648,6 @@
     <p:extLst>
       <p:ext uri="{BB962C8B-B14F-4D97-AF65-F5344CB8AC3E}">
         <p14:creationId xmlns:p14="http://schemas.microsoft.com/office/powerpoint/2010/main" val="686914918"/>
-      </p:ext>
-    </p:extLst>
-  </p:cSld>
-  <p:clrMapOvr>
-    <a:masterClrMapping/>
-  </p:clrMapOvr>
-  <p:timing>
-    <p:tnLst>
-      <p:par>
-        <p:cTn id="1" dur="indefinite" restart="never" nodeType="tmRoot"/>
-      </p:par>
-    </p:tnLst>
-  </p:timing>
-</p:sld>
-</file>
-
-<file path=ppt/slides/slide9.xml><?xml version="1.0" encoding="utf-8"?>
-<p:sld xmlns:a="http://schemas.openxmlformats.org/drawingml/2006/main" xmlns:r="http://schemas.openxmlformats.org/officeDocument/2006/relationships" xmlns:p="http://schemas.openxmlformats.org/presentationml/2006/main">
-  <p:cSld>
-    <p:spTree>
-      <p:nvGrpSpPr>
-        <p:cNvPr id="1" name=""/>
-        <p:cNvGrpSpPr/>
-        <p:nvPr/>
-      </p:nvGrpSpPr>
-      <p:grpSpPr>
-        <a:xfrm>
-          <a:off x="0" y="0"/>
-          <a:ext cx="0" cy="0"/>
-          <a:chOff x="0" y="0"/>
-          <a:chExt cx="0" cy="0"/>
-        </a:xfrm>
-      </p:grpSpPr>
-      <p:sp>
-        <p:nvSpPr>
-          <p:cNvPr id="3" name="Title 1"/>
-          <p:cNvSpPr txBox="1">
-            <a:spLocks/>
-          </p:cNvSpPr>
-          <p:nvPr/>
-        </p:nvSpPr>
-        <p:spPr>
-          <a:xfrm>
-            <a:off x="2873829" y="252867"/>
-            <a:ext cx="8229600" cy="1143000"/>
-          </a:xfrm>
-          <a:prstGeom prst="rect">
-            <a:avLst/>
-          </a:prstGeom>
-        </p:spPr>
-        <p:txBody>
-          <a:bodyPr/>
-          <a:lstStyle>
-            <a:lvl1pPr algn="l" defTabSz="914400" rtl="0" eaLnBrk="1" latinLnBrk="1" hangingPunct="1">
-              <a:lnSpc>
-                <a:spcPct val="90000"/>
-              </a:lnSpc>
-              <a:spcBef>
-                <a:spcPct val="0"/>
-              </a:spcBef>
-              <a:buNone/>
-              <a:defRPr sz="4400" kern="1200">
-                <a:solidFill>
-                  <a:schemeClr val="tx1"/>
-                </a:solidFill>
-                <a:latin typeface="+mj-lt"/>
-                <a:ea typeface="+mj-ea"/>
-                <a:cs typeface="+mj-cs"/>
-              </a:defRPr>
-            </a:lvl1pPr>
-          </a:lstStyle>
-          <a:p>
-            <a:r>
-              <a:rPr lang="en-US" b="1" dirty="0" smtClean="0"/>
-              <a:t>Game Loop Sequence</a:t>
-            </a:r>
-            <a:endParaRPr lang="en-IE" b="1" dirty="0"/>
-          </a:p>
-        </p:txBody>
-      </p:sp>
-      <p:pic>
-        <p:nvPicPr>
-          <p:cNvPr id="4" name="Picture 3"/>
-          <p:cNvPicPr>
-            <a:picLocks noChangeAspect="1"/>
-          </p:cNvPicPr>
-          <p:nvPr/>
-        </p:nvPicPr>
-        <p:blipFill>
-          <a:blip r:embed="rId2">
-            <a:extLst>
-              <a:ext uri="{28A0092B-C50C-407E-A947-70E740481C1C}">
-                <a14:useLocalDpi xmlns:a14="http://schemas.microsoft.com/office/drawing/2010/main" val="0"/>
-              </a:ext>
-            </a:extLst>
-          </a:blip>
-          <a:stretch>
-            <a:fillRect/>
-          </a:stretch>
-        </p:blipFill>
-        <p:spPr>
-          <a:xfrm>
-            <a:off x="0" y="1045029"/>
-            <a:ext cx="12192000" cy="5812971"/>
-          </a:xfrm>
-          <a:prstGeom prst="rect">
-            <a:avLst/>
-          </a:prstGeom>
-        </p:spPr>
-      </p:pic>
-    </p:spTree>
-    <p:extLst>
-      <p:ext uri="{BB962C8B-B14F-4D97-AF65-F5344CB8AC3E}">
-        <p14:creationId xmlns:p14="http://schemas.microsoft.com/office/powerpoint/2010/main" val="2635053961"/>
       </p:ext>
     </p:extLst>
   </p:cSld>
@@ -5378,7 +5707,7 @@
     </a:clrScheme>
     <a:fontScheme name="Office">
       <a:majorFont>
-        <a:latin typeface="맑은 고딕" panose="020F0302020204030204"/>
+        <a:latin typeface="맑은 고딕"/>
         <a:ea typeface=""/>
         <a:cs typeface=""/>
         <a:font script="Jpan" typeface="ＭＳ Ｐゴシック"/>
@@ -5413,7 +5742,7 @@
         <a:font script="Geor" typeface="Sylfaen"/>
       </a:majorFont>
       <a:minorFont>
-        <a:latin typeface="맑은 고딕" panose="020F0502020204030204"/>
+        <a:latin typeface="맑은 고딕"/>
         <a:ea typeface=""/>
         <a:cs typeface=""/>
         <a:font script="Jpan" typeface="ＭＳ Ｐゴシック"/>
@@ -5590,7 +5919,7 @@
   <a:extraClrSchemeLst/>
   <a:extLst>
     <a:ext uri="{05A4C25C-085E-4340-85A3-A5531E510DB2}">
-      <thm15:themeFamily xmlns:thm15="http://schemas.microsoft.com/office/thememl/2012/main" xmlns="" name="Office Theme" id="{62F939B6-93AF-4DB8-9C6B-D6C7DFDC589F}" vid="{4A3C46E8-61CC-4603-A589-7422A47A8E4A}"/>
+      <thm15:themeFamily xmlns="" xmlns:thm15="http://schemas.microsoft.com/office/thememl/2012/main" name="Office Theme" id="{62F939B6-93AF-4DB8-9C6B-D6C7DFDC589F}" vid="{4A3C46E8-61CC-4603-A589-7422A47A8E4A}"/>
     </a:ext>
   </a:extLst>
 </a:theme>

</xml_diff>